<commit_message>
Version 7.0.0 (28.03.2022) - UPDATED: All dependencies
</commit_message>
<xml_diff>
--- a/doc/manual/CWG_S002_var01_v5-PlanetareInvasion_IS_vs_CLAN.pptx
+++ b/doc/manual/CWG_S002_var01_v5-PlanetareInvasion_IS_vs_CLAN.pptx
@@ -243,7 +243,7 @@
           <a:p>
             <a:fld id="{FD7029C7-F9F9-43C6-8A9F-B11F033DBFC4}" type="datetimeFigureOut">
               <a:rPr lang="de-DE" smtClean="0"/>
-              <a:t>23.03.2022</a:t>
+              <a:t>28.03.2022</a:t>
             </a:fld>
             <a:endParaRPr lang="de-DE"/>
           </a:p>
@@ -413,7 +413,7 @@
           <a:p>
             <a:fld id="{FD7029C7-F9F9-43C6-8A9F-B11F033DBFC4}" type="datetimeFigureOut">
               <a:rPr lang="de-DE" smtClean="0"/>
-              <a:t>23.03.2022</a:t>
+              <a:t>28.03.2022</a:t>
             </a:fld>
             <a:endParaRPr lang="de-DE"/>
           </a:p>
@@ -593,7 +593,7 @@
           <a:p>
             <a:fld id="{FD7029C7-F9F9-43C6-8A9F-B11F033DBFC4}" type="datetimeFigureOut">
               <a:rPr lang="de-DE" smtClean="0"/>
-              <a:t>23.03.2022</a:t>
+              <a:t>28.03.2022</a:t>
             </a:fld>
             <a:endParaRPr lang="de-DE"/>
           </a:p>
@@ -763,7 +763,7 @@
           <a:p>
             <a:fld id="{FD7029C7-F9F9-43C6-8A9F-B11F033DBFC4}" type="datetimeFigureOut">
               <a:rPr lang="de-DE" smtClean="0"/>
-              <a:t>23.03.2022</a:t>
+              <a:t>28.03.2022</a:t>
             </a:fld>
             <a:endParaRPr lang="de-DE"/>
           </a:p>
@@ -1009,7 +1009,7 @@
           <a:p>
             <a:fld id="{FD7029C7-F9F9-43C6-8A9F-B11F033DBFC4}" type="datetimeFigureOut">
               <a:rPr lang="de-DE" smtClean="0"/>
-              <a:t>23.03.2022</a:t>
+              <a:t>28.03.2022</a:t>
             </a:fld>
             <a:endParaRPr lang="de-DE"/>
           </a:p>
@@ -1241,7 +1241,7 @@
           <a:p>
             <a:fld id="{FD7029C7-F9F9-43C6-8A9F-B11F033DBFC4}" type="datetimeFigureOut">
               <a:rPr lang="de-DE" smtClean="0"/>
-              <a:t>23.03.2022</a:t>
+              <a:t>28.03.2022</a:t>
             </a:fld>
             <a:endParaRPr lang="de-DE"/>
           </a:p>
@@ -1608,7 +1608,7 @@
           <a:p>
             <a:fld id="{FD7029C7-F9F9-43C6-8A9F-B11F033DBFC4}" type="datetimeFigureOut">
               <a:rPr lang="de-DE" smtClean="0"/>
-              <a:t>23.03.2022</a:t>
+              <a:t>28.03.2022</a:t>
             </a:fld>
             <a:endParaRPr lang="de-DE"/>
           </a:p>
@@ -1726,7 +1726,7 @@
           <a:p>
             <a:fld id="{FD7029C7-F9F9-43C6-8A9F-B11F033DBFC4}" type="datetimeFigureOut">
               <a:rPr lang="de-DE" smtClean="0"/>
-              <a:t>23.03.2022</a:t>
+              <a:t>28.03.2022</a:t>
             </a:fld>
             <a:endParaRPr lang="de-DE"/>
           </a:p>
@@ -1821,7 +1821,7 @@
           <a:p>
             <a:fld id="{FD7029C7-F9F9-43C6-8A9F-B11F033DBFC4}" type="datetimeFigureOut">
               <a:rPr lang="de-DE" smtClean="0"/>
-              <a:t>23.03.2022</a:t>
+              <a:t>28.03.2022</a:t>
             </a:fld>
             <a:endParaRPr lang="de-DE"/>
           </a:p>
@@ -2098,7 +2098,7 @@
           <a:p>
             <a:fld id="{FD7029C7-F9F9-43C6-8A9F-B11F033DBFC4}" type="datetimeFigureOut">
               <a:rPr lang="de-DE" smtClean="0"/>
-              <a:t>23.03.2022</a:t>
+              <a:t>28.03.2022</a:t>
             </a:fld>
             <a:endParaRPr lang="de-DE"/>
           </a:p>
@@ -2355,7 +2355,7 @@
           <a:p>
             <a:fld id="{FD7029C7-F9F9-43C6-8A9F-B11F033DBFC4}" type="datetimeFigureOut">
               <a:rPr lang="de-DE" smtClean="0"/>
-              <a:t>23.03.2022</a:t>
+              <a:t>28.03.2022</a:t>
             </a:fld>
             <a:endParaRPr lang="de-DE"/>
           </a:p>
@@ -2568,7 +2568,7 @@
           <a:p>
             <a:fld id="{FD7029C7-F9F9-43C6-8A9F-B11F033DBFC4}" type="datetimeFigureOut">
               <a:rPr lang="de-DE" smtClean="0"/>
-              <a:t>23.03.2022</a:t>
+              <a:t>28.03.2022</a:t>
             </a:fld>
             <a:endParaRPr lang="de-DE"/>
           </a:p>
@@ -4107,7 +4107,7 @@
                   </a:solidFill>
                   <a:latin typeface="Helvetica" panose="020B0604020202020204" pitchFamily="34" charset="0"/>
                 </a:rPr>
-                <a:t>-Anlage wurde eingenommen, die Landung finden plangemäß und effizient statt. Kurz danach erfolgt der Angriff auf die Anlage im Oase-Gebiet.</a:t>
+                <a:t>-Anlage wurde eingenommen, die Landung findet plangemäß und effizient statt. Kurz danach erfolgt der Angriff auf die Anlage im Oase-Gebiet.</a:t>
               </a:r>
             </a:p>
           </p:txBody>
@@ -6335,7 +6335,7 @@
                   </a:solidFill>
                   <a:latin typeface="Helvetica" panose="020B0604020202020204" pitchFamily="34" charset="0"/>
                 </a:rPr>
-                <a:t>Karte: VIRIDIAN BOG</a:t>
+                <a:t>Karte: EMERALD VALE</a:t>
               </a:r>
             </a:p>
             <a:p>
@@ -6409,7 +6409,7 @@
             <p:nvPr/>
           </p:nvPicPr>
           <p:blipFill>
-            <a:blip r:embed="rId8" cstate="hqprint">
+            <a:blip r:embed="rId13" cstate="hqprint">
               <a:extLst>
                 <a:ext uri="{28A0092B-C50C-407E-A947-70E740481C1C}">
                   <a14:useLocalDpi xmlns:a14="http://schemas.microsoft.com/office/drawing/2010/main" val="0"/>
@@ -6611,7 +6611,7 @@
             <p:nvPr/>
           </p:nvPicPr>
           <p:blipFill>
-            <a:blip r:embed="rId13" cstate="hqprint">
+            <a:blip r:embed="rId14" cstate="hqprint">
               <a:extLst>
                 <a:ext uri="{28A0092B-C50C-407E-A947-70E740481C1C}">
                   <a14:useLocalDpi xmlns:a14="http://schemas.microsoft.com/office/drawing/2010/main" val="0"/>
@@ -6934,7 +6934,7 @@
             <p:nvPr/>
           </p:nvPicPr>
           <p:blipFill>
-            <a:blip r:embed="rId14" cstate="hqprint">
+            <a:blip r:embed="rId15" cstate="hqprint">
               <a:extLst>
                 <a:ext uri="{28A0092B-C50C-407E-A947-70E740481C1C}">
                   <a14:useLocalDpi xmlns:a14="http://schemas.microsoft.com/office/drawing/2010/main" val="0"/>
@@ -7255,7 +7255,7 @@
                   </a:solidFill>
                   <a:latin typeface="Helvetica" panose="020B0604020202020204" pitchFamily="34" charset="0"/>
                 </a:rPr>
-                <a:t>Karte: TERRA THERMA</a:t>
+                <a:t>Karte: HELLEBORE OUTPOST</a:t>
               </a:r>
             </a:p>
             <a:p>
@@ -7309,7 +7309,34 @@
                   </a:solidFill>
                   <a:latin typeface="Helvetica" panose="020B0604020202020204" pitchFamily="34" charset="0"/>
                 </a:rPr>
-                <a:t>Die Angreifer wurden in ihren Vorbereitungen gestört und in das Vulkangebiet zurückgedrängt, wo sie sich erneut zum Kampf stellen müssen.</a:t>
+                <a:t>Die Angreifer wurden in ihren Vorbereitungen gestört und in das </a:t>
+              </a:r>
+              <a:r>
+                <a:rPr lang="de-DE" sz="775" dirty="0" err="1">
+                  <a:solidFill>
+                    <a:srgbClr val="000000"/>
+                  </a:solidFill>
+                  <a:latin typeface="Helvetica" panose="020B0604020202020204" pitchFamily="34" charset="0"/>
+                </a:rPr>
+                <a:t>Hellebore</a:t>
+              </a:r>
+              <a:r>
+                <a:rPr lang="de-DE" sz="775">
+                  <a:solidFill>
+                    <a:srgbClr val="000000"/>
+                  </a:solidFill>
+                  <a:latin typeface="Helvetica" panose="020B0604020202020204" pitchFamily="34" charset="0"/>
+                </a:rPr>
+                <a:t>-Gebiet </a:t>
+              </a:r>
+              <a:r>
+                <a:rPr lang="de-DE" sz="775" dirty="0">
+                  <a:solidFill>
+                    <a:srgbClr val="000000"/>
+                  </a:solidFill>
+                  <a:latin typeface="Helvetica" panose="020B0604020202020204" pitchFamily="34" charset="0"/>
+                </a:rPr>
+                <a:t>zurückgedrängt, wo sie sich erneut zum Kampf stellen müssen.</a:t>
               </a:r>
             </a:p>
             <a:p>
@@ -7338,7 +7365,7 @@
             <p:nvPr/>
           </p:nvPicPr>
           <p:blipFill>
-            <a:blip r:embed="rId15" cstate="hqprint">
+            <a:blip r:embed="rId16" cstate="hqprint">
               <a:extLst>
                 <a:ext uri="{28A0092B-C50C-407E-A947-70E740481C1C}">
                   <a14:useLocalDpi xmlns:a14="http://schemas.microsoft.com/office/drawing/2010/main" val="0"/>
@@ -7531,7 +7558,7 @@
             <p:nvPr/>
           </p:nvPicPr>
           <p:blipFill>
-            <a:blip r:embed="rId16" cstate="hqprint">
+            <a:blip r:embed="rId17" cstate="hqprint">
               <a:extLst>
                 <a:ext uri="{28A0092B-C50C-407E-A947-70E740481C1C}">
                   <a14:useLocalDpi xmlns:a14="http://schemas.microsoft.com/office/drawing/2010/main" val="0"/>
@@ -11788,7 +11815,7 @@
             <p:nvPr/>
           </p:nvPicPr>
           <p:blipFill>
-            <a:blip r:embed="rId17" cstate="print">
+            <a:blip r:embed="rId18" cstate="print">
               <a:extLst>
                 <a:ext uri="{28A0092B-C50C-407E-A947-70E740481C1C}">
                   <a14:useLocalDpi xmlns:a14="http://schemas.microsoft.com/office/drawing/2010/main"/>
@@ -12174,7 +12201,7 @@
             <p:nvPr/>
           </p:nvPicPr>
           <p:blipFill>
-            <a:blip r:embed="rId18" cstate="hqprint">
+            <a:blip r:embed="rId19" cstate="hqprint">
               <a:extLst>
                 <a:ext uri="{28A0092B-C50C-407E-A947-70E740481C1C}">
                   <a14:useLocalDpi xmlns:a14="http://schemas.microsoft.com/office/drawing/2010/main" val="0"/>
@@ -12376,7 +12403,7 @@
             <p:nvPr/>
           </p:nvPicPr>
           <p:blipFill>
-            <a:blip r:embed="rId19" cstate="hqprint">
+            <a:blip r:embed="rId20" cstate="hqprint">
               <a:extLst>
                 <a:ext uri="{28A0092B-C50C-407E-A947-70E740481C1C}">
                   <a14:useLocalDpi xmlns:a14="http://schemas.microsoft.com/office/drawing/2010/main" val="0"/>
@@ -18076,7 +18103,7 @@
           <p:nvPr/>
         </p:nvPicPr>
         <p:blipFill>
-          <a:blip r:embed="rId20">
+          <a:blip r:embed="rId21">
             <a:extLst>
               <a:ext uri="{28A0092B-C50C-407E-A947-70E740481C1C}">
                 <a14:useLocalDpi xmlns:a14="http://schemas.microsoft.com/office/drawing/2010/main"/>
@@ -18262,7 +18289,7 @@
           <p:nvPr/>
         </p:nvPicPr>
         <p:blipFill>
-          <a:blip r:embed="rId21">
+          <a:blip r:embed="rId22">
             <a:extLst>
               <a:ext uri="{28A0092B-C50C-407E-A947-70E740481C1C}">
                 <a14:useLocalDpi xmlns:a14="http://schemas.microsoft.com/office/drawing/2010/main"/>
@@ -18298,7 +18325,7 @@
           <p:nvPr/>
         </p:nvPicPr>
         <p:blipFill>
-          <a:blip r:embed="rId22">
+          <a:blip r:embed="rId23">
             <a:extLst>
               <a:ext uri="{28A0092B-C50C-407E-A947-70E740481C1C}">
                 <a14:useLocalDpi xmlns:a14="http://schemas.microsoft.com/office/drawing/2010/main"/>

</xml_diff>

<commit_message>
Version 7.0.5 (04.04.2022) - CHANGED: Dimensions of the story editor at start
</commit_message>
<xml_diff>
--- a/doc/manual/CWG_S002_var01_v5-PlanetareInvasion_IS_vs_CLAN.pptx
+++ b/doc/manual/CWG_S002_var01_v5-PlanetareInvasion_IS_vs_CLAN.pptx
@@ -243,7 +243,7 @@
           <a:p>
             <a:fld id="{FD7029C7-F9F9-43C6-8A9F-B11F033DBFC4}" type="datetimeFigureOut">
               <a:rPr lang="de-DE" smtClean="0"/>
-              <a:t>28.03.2022</a:t>
+              <a:t>04.04.2022</a:t>
             </a:fld>
             <a:endParaRPr lang="de-DE"/>
           </a:p>
@@ -413,7 +413,7 @@
           <a:p>
             <a:fld id="{FD7029C7-F9F9-43C6-8A9F-B11F033DBFC4}" type="datetimeFigureOut">
               <a:rPr lang="de-DE" smtClean="0"/>
-              <a:t>28.03.2022</a:t>
+              <a:t>04.04.2022</a:t>
             </a:fld>
             <a:endParaRPr lang="de-DE"/>
           </a:p>
@@ -593,7 +593,7 @@
           <a:p>
             <a:fld id="{FD7029C7-F9F9-43C6-8A9F-B11F033DBFC4}" type="datetimeFigureOut">
               <a:rPr lang="de-DE" smtClean="0"/>
-              <a:t>28.03.2022</a:t>
+              <a:t>04.04.2022</a:t>
             </a:fld>
             <a:endParaRPr lang="de-DE"/>
           </a:p>
@@ -763,7 +763,7 @@
           <a:p>
             <a:fld id="{FD7029C7-F9F9-43C6-8A9F-B11F033DBFC4}" type="datetimeFigureOut">
               <a:rPr lang="de-DE" smtClean="0"/>
-              <a:t>28.03.2022</a:t>
+              <a:t>04.04.2022</a:t>
             </a:fld>
             <a:endParaRPr lang="de-DE"/>
           </a:p>
@@ -1009,7 +1009,7 @@
           <a:p>
             <a:fld id="{FD7029C7-F9F9-43C6-8A9F-B11F033DBFC4}" type="datetimeFigureOut">
               <a:rPr lang="de-DE" smtClean="0"/>
-              <a:t>28.03.2022</a:t>
+              <a:t>04.04.2022</a:t>
             </a:fld>
             <a:endParaRPr lang="de-DE"/>
           </a:p>
@@ -1241,7 +1241,7 @@
           <a:p>
             <a:fld id="{FD7029C7-F9F9-43C6-8A9F-B11F033DBFC4}" type="datetimeFigureOut">
               <a:rPr lang="de-DE" smtClean="0"/>
-              <a:t>28.03.2022</a:t>
+              <a:t>04.04.2022</a:t>
             </a:fld>
             <a:endParaRPr lang="de-DE"/>
           </a:p>
@@ -1608,7 +1608,7 @@
           <a:p>
             <a:fld id="{FD7029C7-F9F9-43C6-8A9F-B11F033DBFC4}" type="datetimeFigureOut">
               <a:rPr lang="de-DE" smtClean="0"/>
-              <a:t>28.03.2022</a:t>
+              <a:t>04.04.2022</a:t>
             </a:fld>
             <a:endParaRPr lang="de-DE"/>
           </a:p>
@@ -1726,7 +1726,7 @@
           <a:p>
             <a:fld id="{FD7029C7-F9F9-43C6-8A9F-B11F033DBFC4}" type="datetimeFigureOut">
               <a:rPr lang="de-DE" smtClean="0"/>
-              <a:t>28.03.2022</a:t>
+              <a:t>04.04.2022</a:t>
             </a:fld>
             <a:endParaRPr lang="de-DE"/>
           </a:p>
@@ -1821,7 +1821,7 @@
           <a:p>
             <a:fld id="{FD7029C7-F9F9-43C6-8A9F-B11F033DBFC4}" type="datetimeFigureOut">
               <a:rPr lang="de-DE" smtClean="0"/>
-              <a:t>28.03.2022</a:t>
+              <a:t>04.04.2022</a:t>
             </a:fld>
             <a:endParaRPr lang="de-DE"/>
           </a:p>
@@ -2098,7 +2098,7 @@
           <a:p>
             <a:fld id="{FD7029C7-F9F9-43C6-8A9F-B11F033DBFC4}" type="datetimeFigureOut">
               <a:rPr lang="de-DE" smtClean="0"/>
-              <a:t>28.03.2022</a:t>
+              <a:t>04.04.2022</a:t>
             </a:fld>
             <a:endParaRPr lang="de-DE"/>
           </a:p>
@@ -2355,7 +2355,7 @@
           <a:p>
             <a:fld id="{FD7029C7-F9F9-43C6-8A9F-B11F033DBFC4}" type="datetimeFigureOut">
               <a:rPr lang="de-DE" smtClean="0"/>
-              <a:t>28.03.2022</a:t>
+              <a:t>04.04.2022</a:t>
             </a:fld>
             <a:endParaRPr lang="de-DE"/>
           </a:p>
@@ -2568,7 +2568,7 @@
           <a:p>
             <a:fld id="{FD7029C7-F9F9-43C6-8A9F-B11F033DBFC4}" type="datetimeFigureOut">
               <a:rPr lang="de-DE" smtClean="0"/>
-              <a:t>28.03.2022</a:t>
+              <a:t>04.04.2022</a:t>
             </a:fld>
             <a:endParaRPr lang="de-DE"/>
           </a:p>
@@ -5187,7 +5187,7 @@
                   </a:solidFill>
                   <a:latin typeface="Helvetica" panose="020B0604020202020204" pitchFamily="34" charset="0"/>
                 </a:rPr>
-                <a:t>Karte: CAUSTIC VALLEY</a:t>
+                <a:t>Karte: CANYON NETWORK</a:t>
               </a:r>
             </a:p>
             <a:p>
@@ -16224,7 +16224,7 @@
                   <a:schemeClr val="tx1"/>
                 </a:solidFill>
               </a:rPr>
-              <a:t>S3V1</a:t>
+              <a:t>S2V1</a:t>
             </a:r>
           </a:p>
           <a:p>
@@ -16299,7 +16299,7 @@
                   <a:schemeClr val="tx1"/>
                 </a:solidFill>
               </a:rPr>
-              <a:t>S3V1</a:t>
+              <a:t>S2V1</a:t>
             </a:r>
           </a:p>
           <a:p>
@@ -16374,7 +16374,7 @@
                   <a:schemeClr val="tx1"/>
                 </a:solidFill>
               </a:rPr>
-              <a:t>S3V1</a:t>
+              <a:t>S2V1</a:t>
             </a:r>
           </a:p>
           <a:p>
@@ -16449,7 +16449,7 @@
                   <a:schemeClr val="tx1"/>
                 </a:solidFill>
               </a:rPr>
-              <a:t>S3V1</a:t>
+              <a:t>S2V1</a:t>
             </a:r>
           </a:p>
           <a:p>
@@ -16524,7 +16524,7 @@
                   <a:schemeClr val="tx1"/>
                 </a:solidFill>
               </a:rPr>
-              <a:t>S3V1</a:t>
+              <a:t>S2V1</a:t>
             </a:r>
           </a:p>
           <a:p>
@@ -16599,7 +16599,7 @@
                   <a:schemeClr val="tx1"/>
                 </a:solidFill>
               </a:rPr>
-              <a:t>S3V1</a:t>
+              <a:t>S2V1</a:t>
             </a:r>
           </a:p>
           <a:p>
@@ -16674,7 +16674,7 @@
                   <a:schemeClr val="tx1"/>
                 </a:solidFill>
               </a:rPr>
-              <a:t>S3V1</a:t>
+              <a:t>S2V1</a:t>
             </a:r>
           </a:p>
           <a:p>
@@ -16749,7 +16749,7 @@
                   <a:schemeClr val="tx1"/>
                 </a:solidFill>
               </a:rPr>
-              <a:t>S3V1</a:t>
+              <a:t>S2V1</a:t>
             </a:r>
           </a:p>
           <a:p>
@@ -16824,7 +16824,7 @@
                   <a:schemeClr val="tx1"/>
                 </a:solidFill>
               </a:rPr>
-              <a:t>S3V1</a:t>
+              <a:t>S2V1</a:t>
             </a:r>
           </a:p>
           <a:p>
@@ -16899,7 +16899,7 @@
                   <a:schemeClr val="tx1"/>
                 </a:solidFill>
               </a:rPr>
-              <a:t>S3V1</a:t>
+              <a:t>S2V1</a:t>
             </a:r>
           </a:p>
           <a:p>
@@ -16974,7 +16974,7 @@
                   <a:schemeClr val="tx1"/>
                 </a:solidFill>
               </a:rPr>
-              <a:t>S3V1</a:t>
+              <a:t>S2V1</a:t>
             </a:r>
           </a:p>
           <a:p>
@@ -17049,7 +17049,7 @@
                   <a:schemeClr val="tx1"/>
                 </a:solidFill>
               </a:rPr>
-              <a:t>S3V1</a:t>
+              <a:t>S2V1</a:t>
             </a:r>
           </a:p>
           <a:p>
@@ -17124,7 +17124,7 @@
                   <a:schemeClr val="tx1"/>
                 </a:solidFill>
               </a:rPr>
-              <a:t>S3V1</a:t>
+              <a:t>S2V1</a:t>
             </a:r>
           </a:p>
           <a:p>
@@ -17199,7 +17199,7 @@
                   <a:schemeClr val="tx1"/>
                 </a:solidFill>
               </a:rPr>
-              <a:t>S3V1</a:t>
+              <a:t>S2V1</a:t>
             </a:r>
           </a:p>
           <a:p>
@@ -17274,7 +17274,7 @@
                   <a:schemeClr val="tx1"/>
                 </a:solidFill>
               </a:rPr>
-              <a:t>S3V1</a:t>
+              <a:t>S2V1</a:t>
             </a:r>
           </a:p>
           <a:p>
@@ -17349,7 +17349,7 @@
                   <a:schemeClr val="tx1"/>
                 </a:solidFill>
               </a:rPr>
-              <a:t>S3V1</a:t>
+              <a:t>S2V1</a:t>
             </a:r>
           </a:p>
           <a:p>
@@ -17424,7 +17424,7 @@
                   <a:schemeClr val="tx1"/>
                 </a:solidFill>
               </a:rPr>
-              <a:t>S3V1</a:t>
+              <a:t>S2V1</a:t>
             </a:r>
           </a:p>
           <a:p>
@@ -17499,7 +17499,7 @@
                   <a:schemeClr val="tx1"/>
                 </a:solidFill>
               </a:rPr>
-              <a:t>S3V1</a:t>
+              <a:t>S2V1</a:t>
             </a:r>
           </a:p>
           <a:p>
@@ -17574,7 +17574,7 @@
                   <a:schemeClr val="tx1"/>
                 </a:solidFill>
               </a:rPr>
-              <a:t>S3V1</a:t>
+              <a:t>S2V1</a:t>
             </a:r>
           </a:p>
           <a:p>
@@ -18183,7 +18183,7 @@
                   <a:schemeClr val="tx1"/>
                 </a:solidFill>
               </a:rPr>
-              <a:t>S3V1</a:t>
+              <a:t>S2V1</a:t>
             </a:r>
           </a:p>
           <a:p>
@@ -18258,7 +18258,7 @@
                   <a:schemeClr val="tx1"/>
                 </a:solidFill>
               </a:rPr>
-              <a:t>S3V1</a:t>
+              <a:t>S2V1</a:t>
             </a:r>
           </a:p>
           <a:p>

</xml_diff>

<commit_message>
Version 7.0.15 (15.04.2022) - UPDATED: Second Scenario (IS vs Clan) Tree: maps added - UPDATED: Story editor will remember the last path used while adding sound files - ADDED: Faction banners for final invasion screen - FIXED: Initializer error (multiple calls) fixed in story editor
</commit_message>
<xml_diff>
--- a/doc/manual/CWG_S002_var01_v5-PlanetareInvasion_IS_vs_CLAN.pptx
+++ b/doc/manual/CWG_S002_var01_v5-PlanetareInvasion_IS_vs_CLAN.pptx
@@ -243,7 +243,7 @@
           <a:p>
             <a:fld id="{FD7029C7-F9F9-43C6-8A9F-B11F033DBFC4}" type="datetimeFigureOut">
               <a:rPr lang="de-DE" smtClean="0"/>
-              <a:t>04.04.2022</a:t>
+              <a:t>15.04.2022</a:t>
             </a:fld>
             <a:endParaRPr lang="de-DE"/>
           </a:p>
@@ -413,7 +413,7 @@
           <a:p>
             <a:fld id="{FD7029C7-F9F9-43C6-8A9F-B11F033DBFC4}" type="datetimeFigureOut">
               <a:rPr lang="de-DE" smtClean="0"/>
-              <a:t>04.04.2022</a:t>
+              <a:t>15.04.2022</a:t>
             </a:fld>
             <a:endParaRPr lang="de-DE"/>
           </a:p>
@@ -593,7 +593,7 @@
           <a:p>
             <a:fld id="{FD7029C7-F9F9-43C6-8A9F-B11F033DBFC4}" type="datetimeFigureOut">
               <a:rPr lang="de-DE" smtClean="0"/>
-              <a:t>04.04.2022</a:t>
+              <a:t>15.04.2022</a:t>
             </a:fld>
             <a:endParaRPr lang="de-DE"/>
           </a:p>
@@ -763,7 +763,7 @@
           <a:p>
             <a:fld id="{FD7029C7-F9F9-43C6-8A9F-B11F033DBFC4}" type="datetimeFigureOut">
               <a:rPr lang="de-DE" smtClean="0"/>
-              <a:t>04.04.2022</a:t>
+              <a:t>15.04.2022</a:t>
             </a:fld>
             <a:endParaRPr lang="de-DE"/>
           </a:p>
@@ -1009,7 +1009,7 @@
           <a:p>
             <a:fld id="{FD7029C7-F9F9-43C6-8A9F-B11F033DBFC4}" type="datetimeFigureOut">
               <a:rPr lang="de-DE" smtClean="0"/>
-              <a:t>04.04.2022</a:t>
+              <a:t>15.04.2022</a:t>
             </a:fld>
             <a:endParaRPr lang="de-DE"/>
           </a:p>
@@ -1241,7 +1241,7 @@
           <a:p>
             <a:fld id="{FD7029C7-F9F9-43C6-8A9F-B11F033DBFC4}" type="datetimeFigureOut">
               <a:rPr lang="de-DE" smtClean="0"/>
-              <a:t>04.04.2022</a:t>
+              <a:t>15.04.2022</a:t>
             </a:fld>
             <a:endParaRPr lang="de-DE"/>
           </a:p>
@@ -1608,7 +1608,7 @@
           <a:p>
             <a:fld id="{FD7029C7-F9F9-43C6-8A9F-B11F033DBFC4}" type="datetimeFigureOut">
               <a:rPr lang="de-DE" smtClean="0"/>
-              <a:t>04.04.2022</a:t>
+              <a:t>15.04.2022</a:t>
             </a:fld>
             <a:endParaRPr lang="de-DE"/>
           </a:p>
@@ -1726,7 +1726,7 @@
           <a:p>
             <a:fld id="{FD7029C7-F9F9-43C6-8A9F-B11F033DBFC4}" type="datetimeFigureOut">
               <a:rPr lang="de-DE" smtClean="0"/>
-              <a:t>04.04.2022</a:t>
+              <a:t>15.04.2022</a:t>
             </a:fld>
             <a:endParaRPr lang="de-DE"/>
           </a:p>
@@ -1821,7 +1821,7 @@
           <a:p>
             <a:fld id="{FD7029C7-F9F9-43C6-8A9F-B11F033DBFC4}" type="datetimeFigureOut">
               <a:rPr lang="de-DE" smtClean="0"/>
-              <a:t>04.04.2022</a:t>
+              <a:t>15.04.2022</a:t>
             </a:fld>
             <a:endParaRPr lang="de-DE"/>
           </a:p>
@@ -2098,7 +2098,7 @@
           <a:p>
             <a:fld id="{FD7029C7-F9F9-43C6-8A9F-B11F033DBFC4}" type="datetimeFigureOut">
               <a:rPr lang="de-DE" smtClean="0"/>
-              <a:t>04.04.2022</a:t>
+              <a:t>15.04.2022</a:t>
             </a:fld>
             <a:endParaRPr lang="de-DE"/>
           </a:p>
@@ -2355,7 +2355,7 @@
           <a:p>
             <a:fld id="{FD7029C7-F9F9-43C6-8A9F-B11F033DBFC4}" type="datetimeFigureOut">
               <a:rPr lang="de-DE" smtClean="0"/>
-              <a:t>04.04.2022</a:t>
+              <a:t>15.04.2022</a:t>
             </a:fld>
             <a:endParaRPr lang="de-DE"/>
           </a:p>
@@ -2568,7 +2568,7 @@
           <a:p>
             <a:fld id="{FD7029C7-F9F9-43C6-8A9F-B11F033DBFC4}" type="datetimeFigureOut">
               <a:rPr lang="de-DE" smtClean="0"/>
-              <a:t>04.04.2022</a:t>
+              <a:t>15.04.2022</a:t>
             </a:fld>
             <a:endParaRPr lang="de-DE"/>
           </a:p>
@@ -5241,25 +5241,7 @@
                   </a:solidFill>
                   <a:latin typeface="Helvetica" panose="020B0604020202020204" pitchFamily="34" charset="0"/>
                 </a:rPr>
-                <a:t>Die Stadt wurde eingenommen. Jetzt setzt der Clan auf die Industrieanlage im </a:t>
-              </a:r>
-              <a:r>
-                <a:rPr lang="de-DE" sz="775" dirty="0" err="1">
-                  <a:solidFill>
-                    <a:srgbClr val="000000"/>
-                  </a:solidFill>
-                  <a:latin typeface="Helvetica" panose="020B0604020202020204" pitchFamily="34" charset="0"/>
-                </a:rPr>
-                <a:t>Caustic</a:t>
-              </a:r>
-              <a:r>
-                <a:rPr lang="de-DE" sz="775" dirty="0">
-                  <a:solidFill>
-                    <a:srgbClr val="000000"/>
-                  </a:solidFill>
-                  <a:latin typeface="Helvetica" panose="020B0604020202020204" pitchFamily="34" charset="0"/>
-                </a:rPr>
-                <a:t>-Tal, um den Sieg perfekt zu machen. Die Verteidiger haben sich hierher zurückgezogen.</a:t>
+                <a:t>Die Stadt wurde eingenommen. Jetzt setzten die Angreifer auf die Industrieanlage im Caustic-Tal, um den Sieg perfekt zu machen. Die Verteidiger haben sich hierher zurückgezogen.</a:t>
               </a:r>
             </a:p>
             <a:p>

</xml_diff>